<commit_message>
Add a babel script within the body of the HTML file
</commit_message>
<xml_diff>
--- a/LearnReact.pptx
+++ b/LearnReact.pptx
@@ -2720,7 +2720,7 @@
         <p:spPr>
           <a:xfrm>
             <a:off x="504000" y="301320"/>
-            <a:ext cx="9071280" cy="1261800"/>
+            <a:ext cx="9071640" cy="1261440"/>
           </a:xfrm>
           <a:prstGeom prst="rect">
             <a:avLst/>
@@ -2754,7 +2754,7 @@
         <p:spPr>
           <a:xfrm>
             <a:off x="504000" y="1768680"/>
-            <a:ext cx="9072000" cy="4384080"/>
+            <a:ext cx="9071640" cy="4383720"/>
           </a:xfrm>
           <a:prstGeom prst="rect">
             <a:avLst/>
@@ -2777,12 +2777,12 @@
               <a:buChar char=""/>
             </a:pPr>
             <a:r>
-              <a:rPr b="0" lang="en-US" sz="3200" spc="-1" strike="noStrike">
+              <a:rPr b="0" lang="en-US" sz="1800" spc="-1" strike="noStrike">
                 <a:latin typeface="Arial"/>
               </a:rPr>
               <a:t>Click to edit the outline text format</a:t>
             </a:r>
-            <a:endParaRPr b="0" lang="en-US" sz="3200" spc="-1" strike="noStrike">
+            <a:endParaRPr b="0" lang="en-US" sz="1800" spc="-1" strike="noStrike">
               <a:latin typeface="Arial"/>
             </a:endParaRPr>
           </a:p>
@@ -2799,12 +2799,12 @@
               <a:buChar char=""/>
             </a:pPr>
             <a:r>
-              <a:rPr b="0" lang="en-US" sz="2800" spc="-1" strike="noStrike">
+              <a:rPr b="0" lang="en-US" sz="1800" spc="-1" strike="noStrike">
                 <a:latin typeface="Arial"/>
               </a:rPr>
               <a:t>Second Outline Level</a:t>
             </a:r>
-            <a:endParaRPr b="0" lang="en-US" sz="2800" spc="-1" strike="noStrike">
+            <a:endParaRPr b="0" lang="en-US" sz="1800" spc="-1" strike="noStrike">
               <a:latin typeface="Arial"/>
             </a:endParaRPr>
           </a:p>
@@ -2821,12 +2821,12 @@
               <a:buChar char=""/>
             </a:pPr>
             <a:r>
-              <a:rPr b="0" lang="en-US" sz="2400" spc="-1" strike="noStrike">
+              <a:rPr b="0" lang="en-US" sz="1800" spc="-1" strike="noStrike">
                 <a:latin typeface="Arial"/>
               </a:rPr>
               <a:t>Third Outline Level</a:t>
             </a:r>
-            <a:endParaRPr b="0" lang="en-US" sz="2400" spc="-1" strike="noStrike">
+            <a:endParaRPr b="0" lang="en-US" sz="1800" spc="-1" strike="noStrike">
               <a:latin typeface="Arial"/>
             </a:endParaRPr>
           </a:p>
@@ -2843,12 +2843,12 @@
               <a:buChar char=""/>
             </a:pPr>
             <a:r>
-              <a:rPr b="0" lang="en-US" sz="2000" spc="-1" strike="noStrike">
+              <a:rPr b="0" lang="en-US" sz="1800" spc="-1" strike="noStrike">
                 <a:latin typeface="Arial"/>
               </a:rPr>
               <a:t>Fourth Outline Level</a:t>
             </a:r>
-            <a:endParaRPr b="0" lang="en-US" sz="2000" spc="-1" strike="noStrike">
+            <a:endParaRPr b="0" lang="en-US" sz="1800" spc="-1" strike="noStrike">
               <a:latin typeface="Arial"/>
             </a:endParaRPr>
           </a:p>
@@ -2865,12 +2865,12 @@
               <a:buChar char=""/>
             </a:pPr>
             <a:r>
-              <a:rPr b="0" lang="en-US" sz="2000" spc="-1" strike="noStrike">
+              <a:rPr b="0" lang="en-US" sz="1800" spc="-1" strike="noStrike">
                 <a:latin typeface="Arial"/>
               </a:rPr>
               <a:t>Fifth Outline Level</a:t>
             </a:r>
-            <a:endParaRPr b="0" lang="en-US" sz="2000" spc="-1" strike="noStrike">
+            <a:endParaRPr b="0" lang="en-US" sz="1800" spc="-1" strike="noStrike">
               <a:latin typeface="Arial"/>
             </a:endParaRPr>
           </a:p>
@@ -2887,12 +2887,12 @@
               <a:buChar char=""/>
             </a:pPr>
             <a:r>
-              <a:rPr b="0" lang="en-US" sz="2000" spc="-1" strike="noStrike">
+              <a:rPr b="0" lang="en-US" sz="1800" spc="-1" strike="noStrike">
                 <a:latin typeface="Arial"/>
               </a:rPr>
               <a:t>Sixth Outline Level</a:t>
             </a:r>
-            <a:endParaRPr b="0" lang="en-US" sz="2000" spc="-1" strike="noStrike">
+            <a:endParaRPr b="0" lang="en-US" sz="1800" spc="-1" strike="noStrike">
               <a:latin typeface="Arial"/>
             </a:endParaRPr>
           </a:p>
@@ -2909,12 +2909,12 @@
               <a:buChar char=""/>
             </a:pPr>
             <a:r>
-              <a:rPr b="0" lang="en-US" sz="2000" spc="-1" strike="noStrike">
+              <a:rPr b="0" lang="en-US" sz="1800" spc="-1" strike="noStrike">
                 <a:latin typeface="Arial"/>
               </a:rPr>
               <a:t>Seventh Outline Level</a:t>
             </a:r>
-            <a:endParaRPr b="0" lang="en-US" sz="2000" spc="-1" strike="noStrike">
+            <a:endParaRPr b="0" lang="en-US" sz="1800" spc="-1" strike="noStrike">
               <a:latin typeface="Arial"/>
             </a:endParaRPr>
           </a:p>
@@ -3227,7 +3227,7 @@
         <p:spPr>
           <a:xfrm>
             <a:off x="504000" y="301320"/>
-            <a:ext cx="9071280" cy="1261800"/>
+            <a:ext cx="9070920" cy="1261440"/>
           </a:xfrm>
           <a:prstGeom prst="rect">
             <a:avLst/>
@@ -3253,7 +3253,11 @@
             </a:pPr>
             <a:r>
               <a:rPr b="0" lang="en-US" sz="4400" spc="-1" strike="noStrike">
+                <a:solidFill>
+                  <a:srgbClr val="000000"/>
+                </a:solidFill>
                 <a:latin typeface="Arial"/>
+                <a:ea typeface="DejaVu Sans"/>
               </a:rPr>
               <a:t>React.js</a:t>
             </a:r>
@@ -3273,7 +3277,7 @@
         <p:spPr>
           <a:xfrm>
             <a:off x="504000" y="1769040"/>
-            <a:ext cx="9071280" cy="4384080"/>
+            <a:ext cx="9070920" cy="4383720"/>
           </a:xfrm>
           <a:prstGeom prst="rect">
             <a:avLst/>
@@ -3299,7 +3303,11 @@
             </a:pPr>
             <a:r>
               <a:rPr b="0" lang="en-US" sz="3200" spc="-1" strike="noStrike">
+                <a:solidFill>
+                  <a:srgbClr val="000000"/>
+                </a:solidFill>
                 <a:latin typeface="Arial"/>
+                <a:ea typeface="DejaVu Sans"/>
               </a:rPr>
               <a:t>Learning Material</a:t>
             </a:r>
@@ -3381,7 +3389,7 @@
         <p:spPr>
           <a:xfrm>
             <a:off x="182880" y="0"/>
-            <a:ext cx="9933840" cy="2761560"/>
+            <a:ext cx="9933480" cy="2761200"/>
           </a:xfrm>
           <a:prstGeom prst="rect">
             <a:avLst/>
@@ -3404,7 +3412,7 @@
         <p:spPr>
           <a:xfrm>
             <a:off x="2011680" y="3017520"/>
-            <a:ext cx="5447520" cy="3933000"/>
+            <a:ext cx="5447160" cy="3932640"/>
           </a:xfrm>
           <a:prstGeom prst="rect">
             <a:avLst/>
@@ -3465,14 +3473,14 @@
       </p:grpSpPr>
       <p:sp>
         <p:nvSpPr>
-          <p:cNvPr id="80" name="TextShape 1"/>
-          <p:cNvSpPr txBox="1"/>
+          <p:cNvPr id="80" name="CustomShape 1"/>
+          <p:cNvSpPr/>
           <p:nvPr/>
         </p:nvSpPr>
         <p:spPr>
           <a:xfrm>
             <a:off x="548640" y="182880"/>
-            <a:ext cx="8229600" cy="3161880"/>
+            <a:ext cx="8229240" cy="3161520"/>
           </a:xfrm>
           <a:prstGeom prst="rect">
             <a:avLst/>
@@ -3482,11 +3490,25 @@
             <a:noFill/>
           </a:ln>
         </p:spPr>
+        <p:style>
+          <a:lnRef idx="0"/>
+          <a:fillRef idx="0"/>
+          <a:effectRef idx="0"/>
+          <a:fontRef idx="minor"/>
+        </p:style>
         <p:txBody>
           <a:bodyPr lIns="90000" rIns="90000" tIns="45000" bIns="45000"/>
           <a:p>
+            <a:pPr>
+              <a:lnSpc>
+                <a:spcPct val="100000"/>
+              </a:lnSpc>
+            </a:pPr>
             <a:r>
               <a:rPr b="0" lang="en-US" sz="1800" spc="-1" strike="noStrike">
+                <a:solidFill>
+                  <a:srgbClr val="000000"/>
+                </a:solidFill>
                 <a:latin typeface="Arial"/>
               </a:rPr>
               <a:t>Here, </a:t>
@@ -3502,6 +3524,9 @@
             </a:r>
             <a:r>
               <a:rPr b="0" lang="en-US" sz="1800" spc="-1" strike="noStrike">
+                <a:solidFill>
+                  <a:srgbClr val="000000"/>
+                </a:solidFill>
                 <a:latin typeface="Arial"/>
               </a:rPr>
               <a:t> is a React component class, or React component type. A component takes in parameters, called </a:t>
@@ -3517,6 +3542,9 @@
             </a:r>
             <a:r>
               <a:rPr b="0" lang="en-US" sz="1800" spc="-1" strike="noStrike">
+                <a:solidFill>
+                  <a:srgbClr val="000000"/>
+                </a:solidFill>
                 <a:latin typeface="Arial"/>
               </a:rPr>
               <a:t> (short for “properties”), and returns a hierarchy of views to display via the </a:t>
@@ -3532,6 +3560,9 @@
             </a:r>
             <a:r>
               <a:rPr b="0" lang="en-US" sz="1800" spc="-1" strike="noStrike">
+                <a:solidFill>
+                  <a:srgbClr val="000000"/>
+                </a:solidFill>
                 <a:latin typeface="Arial"/>
               </a:rPr>
               <a:t> method.</a:t>
@@ -3541,13 +3572,26 @@
             </a:endParaRPr>
           </a:p>
           <a:p>
+            <a:pPr>
+              <a:lnSpc>
+                <a:spcPct val="100000"/>
+              </a:lnSpc>
+            </a:pPr>
             <a:endParaRPr b="0" lang="en-US" sz="1800" spc="-1" strike="noStrike">
               <a:latin typeface="Arial"/>
             </a:endParaRPr>
           </a:p>
           <a:p>
+            <a:pPr>
+              <a:lnSpc>
+                <a:spcPct val="100000"/>
+              </a:lnSpc>
+            </a:pPr>
             <a:r>
               <a:rPr b="0" lang="en-US" sz="1800" spc="-1" strike="noStrike">
+                <a:solidFill>
+                  <a:srgbClr val="000000"/>
+                </a:solidFill>
                 <a:latin typeface="Arial"/>
               </a:rPr>
               <a:t>The render method returns a description of what you want to see on the screen. React takes the description and displays the result.</a:t>
@@ -3557,27 +3601,68 @@
             </a:endParaRPr>
           </a:p>
           <a:p>
+            <a:pPr>
+              <a:lnSpc>
+                <a:spcPct val="100000"/>
+              </a:lnSpc>
+            </a:pPr>
             <a:endParaRPr b="0" lang="en-US" sz="1800" spc="-1" strike="noStrike">
               <a:latin typeface="Arial"/>
             </a:endParaRPr>
           </a:p>
           <a:p>
+            <a:pPr>
+              <a:lnSpc>
+                <a:spcPct val="100000"/>
+              </a:lnSpc>
+            </a:pPr>
             <a:r>
               <a:rPr b="0" lang="en-US" sz="1800" spc="-1" strike="noStrike">
+                <a:solidFill>
+                  <a:srgbClr val="000000"/>
+                </a:solidFill>
                 <a:latin typeface="Arial"/>
               </a:rPr>
-              <a:t>Most React developers use a special syntax called “JSX” which makes these structures easier to write. The &lt;div /&gt; syntax is transformed at build time to React.createElement('div'). The example above is equivalent to:</a:t>
+              <a:t>Most React developers use a special syntax called “</a:t>
+            </a:r>
+            <a:r>
+              <a:rPr b="0" lang="en-US" sz="1800" spc="-1" strike="noStrike">
+                <a:solidFill>
+                  <a:srgbClr val="a3238e"/>
+                </a:solidFill>
+                <a:latin typeface="Arial"/>
+              </a:rPr>
+              <a:t>JSX</a:t>
+            </a:r>
+            <a:r>
+              <a:rPr b="0" lang="en-US" sz="1800" spc="-1" strike="noStrike">
+                <a:solidFill>
+                  <a:srgbClr val="000000"/>
+                </a:solidFill>
+                <a:latin typeface="Arial"/>
+              </a:rPr>
+              <a:t>” which makes these structures easier to write. The &lt;div /&gt; syntax is transformed at build time to React.createElement('div'). The example above is equivalent to:</a:t>
             </a:r>
             <a:endParaRPr b="0" lang="en-US" sz="1800" spc="-1" strike="noStrike">
               <a:latin typeface="Arial"/>
             </a:endParaRPr>
           </a:p>
           <a:p>
+            <a:pPr>
+              <a:lnSpc>
+                <a:spcPct val="100000"/>
+              </a:lnSpc>
+            </a:pPr>
             <a:endParaRPr b="0" lang="en-US" sz="1800" spc="-1" strike="noStrike">
               <a:latin typeface="Arial"/>
             </a:endParaRPr>
           </a:p>
           <a:p>
+            <a:pPr>
+              <a:lnSpc>
+                <a:spcPct val="100000"/>
+              </a:lnSpc>
+            </a:pPr>
             <a:endParaRPr b="0" lang="en-US" sz="1800" spc="-1" strike="noStrike">
               <a:latin typeface="Arial"/>
             </a:endParaRPr>
@@ -3596,8 +3681,31 @@
         </p:blipFill>
         <p:spPr>
           <a:xfrm>
-            <a:off x="1371600" y="2947320"/>
-            <a:ext cx="6486120" cy="1076040"/>
+            <a:off x="1371600" y="3200400"/>
+            <a:ext cx="6485760" cy="1075680"/>
+          </a:xfrm>
+          <a:prstGeom prst="rect">
+            <a:avLst/>
+          </a:prstGeom>
+          <a:ln>
+            <a:noFill/>
+          </a:ln>
+        </p:spPr>
+      </p:pic>
+      <p:pic>
+        <p:nvPicPr>
+          <p:cNvPr id="82" name="" descr=""/>
+          <p:cNvPicPr/>
+          <p:nvPr/>
+        </p:nvPicPr>
+        <p:blipFill>
+          <a:blip r:embed="rId2"/>
+          <a:stretch/>
+        </p:blipFill>
+        <p:spPr>
+          <a:xfrm>
+            <a:off x="494640" y="4592160"/>
+            <a:ext cx="8832240" cy="2814480"/>
           </a:xfrm>
           <a:prstGeom prst="rect">
             <a:avLst/>
@@ -3656,29 +3764,40 @@
           <a:chExt cx="0" cy="0"/>
         </a:xfrm>
       </p:grpSpPr>
-      <p:pic>
-        <p:nvPicPr>
-          <p:cNvPr id="82" name="" descr=""/>
-          <p:cNvPicPr/>
+      <p:sp>
+        <p:nvSpPr>
+          <p:cNvPr id="83" name="TextShape 1"/>
+          <p:cNvSpPr txBox="1"/>
           <p:nvPr/>
-        </p:nvPicPr>
-        <p:blipFill>
-          <a:blip r:embed="rId1"/>
-          <a:stretch/>
-        </p:blipFill>
-        <p:spPr>
-          <a:xfrm>
-            <a:off x="585720" y="202680"/>
-            <a:ext cx="8832600" cy="2814840"/>
-          </a:xfrm>
-          <a:prstGeom prst="rect">
-            <a:avLst/>
-          </a:prstGeom>
+        </p:nvSpPr>
+        <p:spPr>
+          <a:xfrm>
+            <a:off x="822960" y="274320"/>
+            <a:ext cx="8229600" cy="858240"/>
+          </a:xfrm>
+          <a:prstGeom prst="rect">
+            <a:avLst/>
+          </a:prstGeom>
+          <a:noFill/>
           <a:ln>
             <a:noFill/>
           </a:ln>
         </p:spPr>
-      </p:pic>
+        <p:txBody>
+          <a:bodyPr lIns="90000" rIns="90000" tIns="45000" bIns="45000"/>
+          <a:p>
+            <a:r>
+              <a:rPr b="0" lang="en-US" sz="1800" spc="-1" strike="noStrike">
+                <a:latin typeface="Arial"/>
+              </a:rPr>
+              <a:t>JSX comes with the full power of JavaScript. You can put any JavaScript expressions within braces inside JSX. Each React element is a JavaScript object that you can store in a variable or pass around in your progra</a:t>
+            </a:r>
+            <a:endParaRPr b="0" lang="en-US" sz="1800" spc="-1" strike="noStrike">
+              <a:latin typeface="Arial"/>
+            </a:endParaRPr>
+          </a:p>
+        </p:txBody>
+      </p:sp>
     </p:spTree>
   </p:cSld>
   <p:timing>

</xml_diff>

<commit_message>
Data change with and without mutation
</commit_message>
<xml_diff>
--- a/LearnReact.pptx
+++ b/LearnReact.pptx
@@ -2720,7 +2720,7 @@
         <p:spPr>
           <a:xfrm>
             <a:off x="504000" y="301320"/>
-            <a:ext cx="9071640" cy="1261440"/>
+            <a:ext cx="9072000" cy="1261800"/>
           </a:xfrm>
           <a:prstGeom prst="rect">
             <a:avLst/>
@@ -2729,13 +2729,14 @@
         <p:txBody>
           <a:bodyPr lIns="0" rIns="0" tIns="0" bIns="0" anchor="ctr"/>
           <a:p>
+            <a:pPr algn="ctr"/>
             <a:r>
-              <a:rPr b="0" lang="en-US" sz="1800" spc="-1" strike="noStrike">
+              <a:rPr b="0" lang="en-US" sz="4400" spc="-1" strike="noStrike">
                 <a:latin typeface="Arial"/>
               </a:rPr>
               <a:t>Click to edit the title text format</a:t>
             </a:r>
-            <a:endParaRPr b="0" lang="en-US" sz="1800" spc="-1" strike="noStrike">
+            <a:endParaRPr b="0" lang="en-US" sz="4400" spc="-1" strike="noStrike">
               <a:latin typeface="Arial"/>
             </a:endParaRPr>
           </a:p>
@@ -2754,7 +2755,7 @@
         <p:spPr>
           <a:xfrm>
             <a:off x="504000" y="1768680"/>
-            <a:ext cx="9071640" cy="4383720"/>
+            <a:ext cx="9072000" cy="4384080"/>
           </a:xfrm>
           <a:prstGeom prst="rect">
             <a:avLst/>
@@ -2777,12 +2778,12 @@
               <a:buChar char=""/>
             </a:pPr>
             <a:r>
-              <a:rPr b="0" lang="en-US" sz="1800" spc="-1" strike="noStrike">
+              <a:rPr b="0" lang="en-US" sz="3200" spc="-1" strike="noStrike">
                 <a:latin typeface="Arial"/>
               </a:rPr>
               <a:t>Click to edit the outline text format</a:t>
             </a:r>
-            <a:endParaRPr b="0" lang="en-US" sz="1800" spc="-1" strike="noStrike">
+            <a:endParaRPr b="0" lang="en-US" sz="3200" spc="-1" strike="noStrike">
               <a:latin typeface="Arial"/>
             </a:endParaRPr>
           </a:p>
@@ -2799,12 +2800,12 @@
               <a:buChar char=""/>
             </a:pPr>
             <a:r>
-              <a:rPr b="0" lang="en-US" sz="1800" spc="-1" strike="noStrike">
+              <a:rPr b="0" lang="en-US" sz="2800" spc="-1" strike="noStrike">
                 <a:latin typeface="Arial"/>
               </a:rPr>
               <a:t>Second Outline Level</a:t>
             </a:r>
-            <a:endParaRPr b="0" lang="en-US" sz="1800" spc="-1" strike="noStrike">
+            <a:endParaRPr b="0" lang="en-US" sz="2800" spc="-1" strike="noStrike">
               <a:latin typeface="Arial"/>
             </a:endParaRPr>
           </a:p>
@@ -2821,12 +2822,12 @@
               <a:buChar char=""/>
             </a:pPr>
             <a:r>
-              <a:rPr b="0" lang="en-US" sz="1800" spc="-1" strike="noStrike">
+              <a:rPr b="0" lang="en-US" sz="2400" spc="-1" strike="noStrike">
                 <a:latin typeface="Arial"/>
               </a:rPr>
               <a:t>Third Outline Level</a:t>
             </a:r>
-            <a:endParaRPr b="0" lang="en-US" sz="1800" spc="-1" strike="noStrike">
+            <a:endParaRPr b="0" lang="en-US" sz="2400" spc="-1" strike="noStrike">
               <a:latin typeface="Arial"/>
             </a:endParaRPr>
           </a:p>
@@ -2843,12 +2844,12 @@
               <a:buChar char=""/>
             </a:pPr>
             <a:r>
-              <a:rPr b="0" lang="en-US" sz="1800" spc="-1" strike="noStrike">
+              <a:rPr b="0" lang="en-US" sz="2000" spc="-1" strike="noStrike">
                 <a:latin typeface="Arial"/>
               </a:rPr>
               <a:t>Fourth Outline Level</a:t>
             </a:r>
-            <a:endParaRPr b="0" lang="en-US" sz="1800" spc="-1" strike="noStrike">
+            <a:endParaRPr b="0" lang="en-US" sz="2000" spc="-1" strike="noStrike">
               <a:latin typeface="Arial"/>
             </a:endParaRPr>
           </a:p>
@@ -2865,12 +2866,12 @@
               <a:buChar char=""/>
             </a:pPr>
             <a:r>
-              <a:rPr b="0" lang="en-US" sz="1800" spc="-1" strike="noStrike">
+              <a:rPr b="0" lang="en-US" sz="2000" spc="-1" strike="noStrike">
                 <a:latin typeface="Arial"/>
               </a:rPr>
               <a:t>Fifth Outline Level</a:t>
             </a:r>
-            <a:endParaRPr b="0" lang="en-US" sz="1800" spc="-1" strike="noStrike">
+            <a:endParaRPr b="0" lang="en-US" sz="2000" spc="-1" strike="noStrike">
               <a:latin typeface="Arial"/>
             </a:endParaRPr>
           </a:p>
@@ -2887,12 +2888,12 @@
               <a:buChar char=""/>
             </a:pPr>
             <a:r>
-              <a:rPr b="0" lang="en-US" sz="1800" spc="-1" strike="noStrike">
+              <a:rPr b="0" lang="en-US" sz="2000" spc="-1" strike="noStrike">
                 <a:latin typeface="Arial"/>
               </a:rPr>
               <a:t>Sixth Outline Level</a:t>
             </a:r>
-            <a:endParaRPr b="0" lang="en-US" sz="1800" spc="-1" strike="noStrike">
+            <a:endParaRPr b="0" lang="en-US" sz="2000" spc="-1" strike="noStrike">
               <a:latin typeface="Arial"/>
             </a:endParaRPr>
           </a:p>
@@ -2909,12 +2910,12 @@
               <a:buChar char=""/>
             </a:pPr>
             <a:r>
-              <a:rPr b="0" lang="en-US" sz="1800" spc="-1" strike="noStrike">
+              <a:rPr b="0" lang="en-US" sz="2000" spc="-1" strike="noStrike">
                 <a:latin typeface="Arial"/>
               </a:rPr>
               <a:t>Seventh Outline Level</a:t>
             </a:r>
-            <a:endParaRPr b="0" lang="en-US" sz="1800" spc="-1" strike="noStrike">
+            <a:endParaRPr b="0" lang="en-US" sz="2000" spc="-1" strike="noStrike">
               <a:latin typeface="Arial"/>
             </a:endParaRPr>
           </a:p>
@@ -3227,7 +3228,7 @@
         <p:spPr>
           <a:xfrm>
             <a:off x="504000" y="301320"/>
-            <a:ext cx="9070920" cy="1261440"/>
+            <a:ext cx="9070560" cy="1261080"/>
           </a:xfrm>
           <a:prstGeom prst="rect">
             <a:avLst/>
@@ -3277,7 +3278,7 @@
         <p:spPr>
           <a:xfrm>
             <a:off x="504000" y="1769040"/>
-            <a:ext cx="9070920" cy="4383720"/>
+            <a:ext cx="9070560" cy="4383360"/>
           </a:xfrm>
           <a:prstGeom prst="rect">
             <a:avLst/>
@@ -3389,7 +3390,7 @@
         <p:spPr>
           <a:xfrm>
             <a:off x="182880" y="0"/>
-            <a:ext cx="9933480" cy="2761200"/>
+            <a:ext cx="9933120" cy="2760840"/>
           </a:xfrm>
           <a:prstGeom prst="rect">
             <a:avLst/>
@@ -3412,7 +3413,7 @@
         <p:spPr>
           <a:xfrm>
             <a:off x="2011680" y="3017520"/>
-            <a:ext cx="5447160" cy="3932640"/>
+            <a:ext cx="5446800" cy="3932280"/>
           </a:xfrm>
           <a:prstGeom prst="rect">
             <a:avLst/>
@@ -3480,7 +3481,7 @@
         <p:spPr>
           <a:xfrm>
             <a:off x="548640" y="182880"/>
-            <a:ext cx="8229240" cy="3161520"/>
+            <a:ext cx="8228880" cy="3161160"/>
           </a:xfrm>
           <a:prstGeom prst="rect">
             <a:avLst/>
@@ -3510,6 +3511,7 @@
                   <a:srgbClr val="000000"/>
                 </a:solidFill>
                 <a:latin typeface="Arial"/>
+                <a:ea typeface="DejaVu Sans"/>
               </a:rPr>
               <a:t>Here, </a:t>
             </a:r>
@@ -3519,6 +3521,7 @@
                   <a:srgbClr val="a3238e"/>
                 </a:solidFill>
                 <a:latin typeface="Arial"/>
+                <a:ea typeface="DejaVu Sans"/>
               </a:rPr>
               <a:t>ShoppingList</a:t>
             </a:r>
@@ -3528,6 +3531,7 @@
                   <a:srgbClr val="000000"/>
                 </a:solidFill>
                 <a:latin typeface="Arial"/>
+                <a:ea typeface="DejaVu Sans"/>
               </a:rPr>
               <a:t> is a React component class, or React component type. A component takes in parameters, called </a:t>
             </a:r>
@@ -3537,6 +3541,7 @@
                   <a:srgbClr val="a3238e"/>
                 </a:solidFill>
                 <a:latin typeface="Arial"/>
+                <a:ea typeface="DejaVu Sans"/>
               </a:rPr>
               <a:t>props</a:t>
             </a:r>
@@ -3546,6 +3551,7 @@
                   <a:srgbClr val="000000"/>
                 </a:solidFill>
                 <a:latin typeface="Arial"/>
+                <a:ea typeface="DejaVu Sans"/>
               </a:rPr>
               <a:t> (short for “properties”), and returns a hierarchy of views to display via the </a:t>
             </a:r>
@@ -3555,6 +3561,7 @@
                   <a:srgbClr val="a3238e"/>
                 </a:solidFill>
                 <a:latin typeface="Arial"/>
+                <a:ea typeface="DejaVu Sans"/>
               </a:rPr>
               <a:t>render</a:t>
             </a:r>
@@ -3564,6 +3571,7 @@
                   <a:srgbClr val="000000"/>
                 </a:solidFill>
                 <a:latin typeface="Arial"/>
+                <a:ea typeface="DejaVu Sans"/>
               </a:rPr>
               <a:t> method.</a:t>
             </a:r>
@@ -3593,6 +3601,7 @@
                   <a:srgbClr val="000000"/>
                 </a:solidFill>
                 <a:latin typeface="Arial"/>
+                <a:ea typeface="DejaVu Sans"/>
               </a:rPr>
               <a:t>The render method returns a description of what you want to see on the screen. React takes the description and displays the result.</a:t>
             </a:r>
@@ -3622,6 +3631,7 @@
                   <a:srgbClr val="000000"/>
                 </a:solidFill>
                 <a:latin typeface="Arial"/>
+                <a:ea typeface="DejaVu Sans"/>
               </a:rPr>
               <a:t>Most React developers use a special syntax called “</a:t>
             </a:r>
@@ -3631,6 +3641,7 @@
                   <a:srgbClr val="a3238e"/>
                 </a:solidFill>
                 <a:latin typeface="Arial"/>
+                <a:ea typeface="DejaVu Sans"/>
               </a:rPr>
               <a:t>JSX</a:t>
             </a:r>
@@ -3640,6 +3651,7 @@
                   <a:srgbClr val="000000"/>
                 </a:solidFill>
                 <a:latin typeface="Arial"/>
+                <a:ea typeface="DejaVu Sans"/>
               </a:rPr>
               <a:t>” which makes these structures easier to write. The &lt;div /&gt; syntax is transformed at build time to React.createElement('div'). The example above is equivalent to:</a:t>
             </a:r>
@@ -3682,7 +3694,7 @@
         <p:spPr>
           <a:xfrm>
             <a:off x="1371600" y="3200400"/>
-            <a:ext cx="6485760" cy="1075680"/>
+            <a:ext cx="6485400" cy="1075320"/>
           </a:xfrm>
           <a:prstGeom prst="rect">
             <a:avLst/>
@@ -3705,7 +3717,7 @@
         <p:spPr>
           <a:xfrm>
             <a:off x="494640" y="4592160"/>
-            <a:ext cx="8832240" cy="2814480"/>
+            <a:ext cx="8831880" cy="2814120"/>
           </a:xfrm>
           <a:prstGeom prst="rect">
             <a:avLst/>
@@ -3766,14 +3778,14 @@
       </p:grpSpPr>
       <p:sp>
         <p:nvSpPr>
-          <p:cNvPr id="83" name="TextShape 1"/>
-          <p:cNvSpPr txBox="1"/>
+          <p:cNvPr id="83" name="CustomShape 1"/>
+          <p:cNvSpPr/>
           <p:nvPr/>
         </p:nvSpPr>
         <p:spPr>
           <a:xfrm>
             <a:off x="822960" y="274320"/>
-            <a:ext cx="8229600" cy="858240"/>
+            <a:ext cx="8229240" cy="857880"/>
           </a:xfrm>
           <a:prstGeom prst="rect">
             <a:avLst/>
@@ -3783,14 +3795,34 @@
             <a:noFill/>
           </a:ln>
         </p:spPr>
+        <p:style>
+          <a:lnRef idx="0"/>
+          <a:fillRef idx="0"/>
+          <a:effectRef idx="0"/>
+          <a:fontRef idx="minor"/>
+        </p:style>
         <p:txBody>
           <a:bodyPr lIns="90000" rIns="90000" tIns="45000" bIns="45000"/>
           <a:p>
+            <a:pPr>
+              <a:lnSpc>
+                <a:spcPct val="100000"/>
+              </a:lnSpc>
+            </a:pPr>
+            <a:r>
+              <a:rPr b="0" lang="en-US" sz="1800" spc="-1" strike="noStrike">
+                <a:solidFill>
+                  <a:srgbClr val="a3238e"/>
+                </a:solidFill>
+                <a:latin typeface="Arial"/>
+              </a:rPr>
+              <a:t>JSX</a:t>
+            </a:r>
             <a:r>
               <a:rPr b="0" lang="en-US" sz="1800" spc="-1" strike="noStrike">
                 <a:latin typeface="Arial"/>
               </a:rPr>
-              <a:t>JSX comes with the full power of JavaScript. You can put any JavaScript expressions within braces inside JSX. Each React element is a JavaScript object that you can store in a variable or pass around in your progra</a:t>
+              <a:t> comes with the full power of JavaScript. You can put any JavaScript expressions within braces inside JSX.</a:t>
             </a:r>
             <a:endParaRPr b="0" lang="en-US" sz="1800" spc="-1" strike="noStrike">
               <a:latin typeface="Arial"/>
@@ -3798,6 +3830,29 @@
           </a:p>
         </p:txBody>
       </p:sp>
+      <p:pic>
+        <p:nvPicPr>
+          <p:cNvPr id="84" name="" descr=""/>
+          <p:cNvPicPr/>
+          <p:nvPr/>
+        </p:nvPicPr>
+        <p:blipFill>
+          <a:blip r:embed="rId1"/>
+          <a:stretch/>
+        </p:blipFill>
+        <p:spPr>
+          <a:xfrm>
+            <a:off x="106920" y="1370160"/>
+            <a:ext cx="9860040" cy="4756320"/>
+          </a:xfrm>
+          <a:prstGeom prst="rect">
+            <a:avLst/>
+          </a:prstGeom>
+          <a:ln>
+            <a:noFill/>
+          </a:ln>
+        </p:spPr>
+      </p:pic>
     </p:spTree>
   </p:cSld>
   <p:timing>

</xml_diff>

<commit_message>
Preserve and allow user to navigate to game state in history and start over from that point
</commit_message>
<xml_diff>
--- a/LearnReact.pptx
+++ b/LearnReact.pptx
@@ -3229,7 +3229,7 @@
         <p:spPr>
           <a:xfrm>
             <a:off x="504000" y="301320"/>
-            <a:ext cx="9070560" cy="1261080"/>
+            <a:ext cx="9070200" cy="1260720"/>
           </a:xfrm>
           <a:prstGeom prst="rect">
             <a:avLst/>
@@ -3279,7 +3279,7 @@
         <p:spPr>
           <a:xfrm>
             <a:off x="504000" y="1769040"/>
-            <a:ext cx="9070560" cy="4383360"/>
+            <a:ext cx="9070200" cy="4383000"/>
           </a:xfrm>
           <a:prstGeom prst="rect">
             <a:avLst/>
@@ -3391,7 +3391,7 @@
         <p:spPr>
           <a:xfrm>
             <a:off x="182880" y="0"/>
-            <a:ext cx="9933120" cy="2760840"/>
+            <a:ext cx="9932760" cy="2760480"/>
           </a:xfrm>
           <a:prstGeom prst="rect">
             <a:avLst/>
@@ -3414,7 +3414,7 @@
         <p:spPr>
           <a:xfrm>
             <a:off x="2011680" y="3017520"/>
-            <a:ext cx="5446800" cy="3932280"/>
+            <a:ext cx="5446440" cy="3931920"/>
           </a:xfrm>
           <a:prstGeom prst="rect">
             <a:avLst/>
@@ -3482,7 +3482,7 @@
         <p:spPr>
           <a:xfrm>
             <a:off x="548640" y="182880"/>
-            <a:ext cx="8228880" cy="3161160"/>
+            <a:ext cx="8228520" cy="3160800"/>
           </a:xfrm>
           <a:prstGeom prst="rect">
             <a:avLst/>
@@ -3695,7 +3695,7 @@
         <p:spPr>
           <a:xfrm>
             <a:off x="1371600" y="3200400"/>
-            <a:ext cx="6485400" cy="1075320"/>
+            <a:ext cx="6485040" cy="1074960"/>
           </a:xfrm>
           <a:prstGeom prst="rect">
             <a:avLst/>
@@ -3718,7 +3718,7 @@
         <p:spPr>
           <a:xfrm>
             <a:off x="494640" y="4592160"/>
-            <a:ext cx="8831880" cy="2814120"/>
+            <a:ext cx="8831520" cy="2813760"/>
           </a:xfrm>
           <a:prstGeom prst="rect">
             <a:avLst/>
@@ -3786,7 +3786,7 @@
         <p:spPr>
           <a:xfrm>
             <a:off x="822960" y="274320"/>
-            <a:ext cx="8229240" cy="857880"/>
+            <a:ext cx="8228880" cy="857520"/>
           </a:xfrm>
           <a:prstGeom prst="rect">
             <a:avLst/>
@@ -3816,12 +3816,17 @@
                   <a:srgbClr val="a3238e"/>
                 </a:solidFill>
                 <a:latin typeface="Arial"/>
+                <a:ea typeface="DejaVu Sans"/>
               </a:rPr>
               <a:t>JSX</a:t>
             </a:r>
             <a:r>
               <a:rPr b="0" lang="en-US" sz="1800" spc="-1" strike="noStrike">
+                <a:solidFill>
+                  <a:srgbClr val="000000"/>
+                </a:solidFill>
                 <a:latin typeface="Arial"/>
+                <a:ea typeface="DejaVu Sans"/>
               </a:rPr>
               <a:t> comes with the full power of JavaScript. You can put any JavaScript expressions within braces inside JSX.</a:t>
             </a:r>
@@ -3844,7 +3849,7 @@
         <p:spPr>
           <a:xfrm>
             <a:off x="106920" y="1370160"/>
-            <a:ext cx="9860040" cy="4756320"/>
+            <a:ext cx="9859680" cy="4755960"/>
           </a:xfrm>
           <a:prstGeom prst="rect">
             <a:avLst/>
@@ -3905,14 +3910,14 @@
       </p:grpSpPr>
       <p:sp>
         <p:nvSpPr>
-          <p:cNvPr id="85" name="TextShape 1"/>
-          <p:cNvSpPr txBox="1"/>
+          <p:cNvPr id="85" name="CustomShape 1"/>
+          <p:cNvSpPr/>
           <p:nvPr/>
         </p:nvSpPr>
         <p:spPr>
           <a:xfrm>
             <a:off x="365760" y="274320"/>
-            <a:ext cx="9509760" cy="3929760"/>
+            <a:ext cx="9509400" cy="3929400"/>
           </a:xfrm>
           <a:prstGeom prst="rect">
             <a:avLst/>
@@ -3922,43 +3927,46 @@
             <a:noFill/>
           </a:ln>
         </p:spPr>
+        <p:style>
+          <a:lnRef idx="0"/>
+          <a:fillRef idx="0"/>
+          <a:effectRef idx="0"/>
+          <a:fontRef idx="minor"/>
+        </p:style>
         <p:txBody>
           <a:bodyPr lIns="90000" rIns="90000" tIns="45000" bIns="45000"/>
           <a:p>
+            <a:pPr>
+              <a:lnSpc>
+                <a:spcPct val="100000"/>
+              </a:lnSpc>
+            </a:pPr>
             <a:r>
               <a:rPr b="0" lang="en-US" sz="1800" spc="-1" strike="noStrike">
                 <a:latin typeface="Arial"/>
               </a:rPr>
-              <a:t>Immutability makes complex features much easier to implement. a “time travel” feature that </a:t>
-            </a:r>
-            <a:r>
-              <a:rPr b="0" lang="en-US" sz="1800" spc="-1" strike="noStrike">
-                <a:latin typeface="Arial"/>
-              </a:rPr>
-              <a:t>allows us to review the tic-tac-toe game’s history and “jump back” to previous moves.  an ability </a:t>
-            </a:r>
-            <a:r>
-              <a:rPr b="0" lang="en-US" sz="1800" spc="-1" strike="noStrike">
-                <a:latin typeface="Arial"/>
-              </a:rPr>
-              <a:t>to undo and redo certain actions is a common requirement in applications. Avoiding direct data </a:t>
-            </a:r>
-            <a:r>
-              <a:rPr b="0" lang="en-US" sz="1800" spc="-1" strike="noStrike">
-                <a:latin typeface="Arial"/>
-              </a:rPr>
-              <a:t>mutation lets us keep previous versions of the game’s history intact, and reuse them later.</a:t>
+              <a:t>Immutability makes complex features much easier to implement. a “time travel” feature that allows us to review the tic-tac-toe game’s history and “jump back” to previous moves.  an ability to undo and redo certain actions is a common requirement in applications. Avoiding direct data mutation lets us keep previous versions of the game’s history intact, and reuse them later.</a:t>
             </a:r>
             <a:endParaRPr b="0" lang="en-US" sz="1800" spc="-1" strike="noStrike">
               <a:latin typeface="Arial"/>
             </a:endParaRPr>
           </a:p>
           <a:p>
+            <a:pPr>
+              <a:lnSpc>
+                <a:spcPct val="100000"/>
+              </a:lnSpc>
+            </a:pPr>
             <a:endParaRPr b="0" lang="en-US" sz="1800" spc="-1" strike="noStrike">
               <a:latin typeface="Arial"/>
             </a:endParaRPr>
           </a:p>
           <a:p>
+            <a:pPr>
+              <a:lnSpc>
+                <a:spcPct val="100000"/>
+              </a:lnSpc>
+            </a:pPr>
             <a:r>
               <a:rPr b="0" lang="en-US" sz="1800" spc="-1" strike="noStrike">
                 <a:latin typeface="Arial"/>
@@ -3970,11 +3978,25 @@
             </a:endParaRPr>
           </a:p>
           <a:p>
+            <a:pPr>
+              <a:lnSpc>
+                <a:spcPct val="100000"/>
+              </a:lnSpc>
+            </a:pPr>
             <a:r>
               <a:rPr b="0" lang="en-US" sz="1800" spc="-1" strike="noStrike">
                 <a:latin typeface="Arial"/>
               </a:rPr>
-              <a:t>Detecting changes in </a:t>
+              <a:t>Detecting changes in</a:t>
+            </a:r>
+            <a:r>
+              <a:rPr b="0" lang="en-US" sz="1800" spc="-1" strike="noStrike">
+                <a:solidFill>
+                  <a:srgbClr val="000000"/>
+                </a:solidFill>
+                <a:latin typeface="Arial"/>
+              </a:rPr>
+              <a:t> </a:t>
             </a:r>
             <a:r>
               <a:rPr b="0" lang="en-US" sz="1800" spc="-1" strike="noStrike">
@@ -3987,34 +4009,38 @@
             </a:r>
             <a:r>
               <a:rPr b="0" lang="en-US" sz="1800" spc="-1" strike="noStrike">
+                <a:solidFill>
+                  <a:srgbClr val="000000"/>
+                </a:solidFill>
                 <a:latin typeface="Arial"/>
               </a:rPr>
-              <a:t> objects is difficult because they are modified directly. This </a:t>
+              <a:t> objects is difficult because they are modified directly. This detection requires the mutable object to be compared to previous copies of itself and the entire object tree to be traversed.</a:t>
             </a:r>
+            <a:endParaRPr b="0" lang="en-US" sz="1800" spc="-1" strike="noStrike">
+              <a:latin typeface="Arial"/>
+            </a:endParaRPr>
+          </a:p>
+          <a:p>
+            <a:pPr>
+              <a:lnSpc>
+                <a:spcPct val="100000"/>
+              </a:lnSpc>
+            </a:pPr>
+            <a:endParaRPr b="0" lang="en-US" sz="1800" spc="-1" strike="noStrike">
+              <a:latin typeface="Arial"/>
+            </a:endParaRPr>
+          </a:p>
+          <a:p>
+            <a:pPr>
+              <a:lnSpc>
+                <a:spcPct val="100000"/>
+              </a:lnSpc>
+            </a:pPr>
             <a:r>
               <a:rPr b="0" lang="en-US" sz="1800" spc="-1" strike="noStrike">
-                <a:latin typeface="Arial"/>
-              </a:rPr>
-              <a:t>detection requires the mutable object to be compared to previous copies of itself and the entire </a:t>
-            </a:r>
-            <a:r>
-              <a:rPr b="0" lang="en-US" sz="1800" spc="-1" strike="noStrike">
-                <a:latin typeface="Arial"/>
-              </a:rPr>
-              <a:t>object tree to be traversed.</a:t>
-            </a:r>
-            <a:endParaRPr b="0" lang="en-US" sz="1800" spc="-1" strike="noStrike">
-              <a:latin typeface="Arial"/>
-            </a:endParaRPr>
-          </a:p>
-          <a:p>
-            <a:endParaRPr b="0" lang="en-US" sz="1800" spc="-1" strike="noStrike">
-              <a:latin typeface="Arial"/>
-            </a:endParaRPr>
-          </a:p>
-          <a:p>
-            <a:r>
-              <a:rPr b="0" lang="en-US" sz="1800" spc="-1" strike="noStrike">
+                <a:solidFill>
+                  <a:srgbClr val="000000"/>
+                </a:solidFill>
                 <a:latin typeface="Arial"/>
               </a:rPr>
               <a:t>Detecting changes in </a:t>
@@ -4030,26 +4056,33 @@
             </a:r>
             <a:r>
               <a:rPr b="0" lang="en-US" sz="1800" spc="-1" strike="noStrike">
+                <a:solidFill>
+                  <a:srgbClr val="000000"/>
+                </a:solidFill>
                 <a:latin typeface="Arial"/>
               </a:rPr>
-              <a:t> objects is considerably easier. If the immutable object that is </a:t>
-            </a:r>
-            <a:r>
-              <a:rPr b="0" lang="en-US" sz="1800" spc="-1" strike="noStrike">
-                <a:latin typeface="Arial"/>
-              </a:rPr>
-              <a:t>being referenced is different than the previous one, then the object has changed.</a:t>
+              <a:t> objects is considerably easier. If the immutable object that is being referenced is different than the previous one, then the object has changed.</a:t>
             </a:r>
             <a:endParaRPr b="0" lang="en-US" sz="1800" spc="-1" strike="noStrike">
               <a:latin typeface="Arial"/>
             </a:endParaRPr>
           </a:p>
           <a:p>
+            <a:pPr>
+              <a:lnSpc>
+                <a:spcPct val="100000"/>
+              </a:lnSpc>
+            </a:pPr>
             <a:endParaRPr b="0" lang="en-US" sz="1800" spc="-1" strike="noStrike">
               <a:latin typeface="Arial"/>
             </a:endParaRPr>
           </a:p>
           <a:p>
+            <a:pPr>
+              <a:lnSpc>
+                <a:spcPct val="100000"/>
+              </a:lnSpc>
+            </a:pPr>
             <a:endParaRPr b="0" lang="en-US" sz="1800" spc="-1" strike="noStrike">
               <a:latin typeface="Arial"/>
             </a:endParaRPr>
@@ -4058,14 +4091,14 @@
       </p:sp>
       <p:sp>
         <p:nvSpPr>
-          <p:cNvPr id="86" name="TextShape 2"/>
-          <p:cNvSpPr txBox="1"/>
+          <p:cNvPr id="86" name="CustomShape 2"/>
+          <p:cNvSpPr/>
           <p:nvPr/>
         </p:nvSpPr>
         <p:spPr>
           <a:xfrm>
             <a:off x="457200" y="4023360"/>
-            <a:ext cx="9235440" cy="2138040"/>
+            <a:ext cx="9235080" cy="2137680"/>
           </a:xfrm>
           <a:prstGeom prst="rect">
             <a:avLst/>
@@ -4075,9 +4108,20 @@
             <a:noFill/>
           </a:ln>
         </p:spPr>
+        <p:style>
+          <a:lnRef idx="0"/>
+          <a:fillRef idx="0"/>
+          <a:effectRef idx="0"/>
+          <a:fontRef idx="minor"/>
+        </p:style>
         <p:txBody>
           <a:bodyPr lIns="90000" rIns="90000" tIns="45000" bIns="45000"/>
           <a:p>
+            <a:pPr>
+              <a:lnSpc>
+                <a:spcPct val="100000"/>
+              </a:lnSpc>
+            </a:pPr>
             <a:r>
               <a:rPr b="0" lang="en-US" sz="1800" spc="-1" strike="noStrike">
                 <a:solidFill>
@@ -4089,11 +4133,17 @@
             </a:r>
             <a:r>
               <a:rPr b="0" lang="en-US" sz="1800" spc="-1" strike="noStrike">
+                <a:solidFill>
+                  <a:srgbClr val="000000"/>
+                </a:solidFill>
                 <a:latin typeface="Arial"/>
               </a:rPr>
               <a:t> - In React, function components are a simpler way to write components that only contain a render method and don’t have their own state. Instead of defining a class which extends React.Component, we can write a function that takes props as input and returns what should be rendered.</a:t>
             </a:r>
             <a:endParaRPr b="0" lang="en-US" sz="1800" spc="-1" strike="noStrike">
+              <a:solidFill>
+                <a:srgbClr val="000000"/>
+              </a:solidFill>
               <a:latin typeface="Arial"/>
             </a:endParaRPr>
           </a:p>
@@ -4101,6 +4151,33 @@
       </p:sp>
     </p:spTree>
   </p:cSld>
+  <p:timing>
+    <p:tnLst>
+      <p:par>
+        <p:cTn id="9" dur="indefinite" restart="never" nodeType="tmRoot">
+          <p:childTnLst>
+            <p:seq>
+              <p:cTn id="10" dur="indefinite" nodeType="mainSeq"/>
+              <p:prevCondLst>
+                <p:cond delay="0" evt="onPrev">
+                  <p:tgtEl>
+                    <p:sldTgt/>
+                  </p:tgtEl>
+                </p:cond>
+              </p:prevCondLst>
+              <p:nextCondLst>
+                <p:cond delay="0" evt="onNext">
+                  <p:tgtEl>
+                    <p:sldTgt/>
+                  </p:tgtEl>
+                </p:cond>
+              </p:nextCondLst>
+            </p:seq>
+          </p:childTnLst>
+        </p:cTn>
+      </p:par>
+    </p:tnLst>
+  </p:timing>
 </p:sld>
 </file>
 

</xml_diff>

<commit_message>
What is ReactJS Why should I use ReactJS
</commit_message>
<xml_diff>
--- a/LearnReact.pptx
+++ b/LearnReact.pptx
@@ -11,6 +11,7 @@
     <p:sldId id="258" r:id="rId6"/>
     <p:sldId id="259" r:id="rId7"/>
     <p:sldId id="260" r:id="rId8"/>
+    <p:sldId id="261" r:id="rId9"/>
   </p:sldIdLst>
   <p:sldSz cx="10080625" cy="7559675"/>
   <p:notesSz cx="7559675" cy="10691812"/>
@@ -3229,7 +3230,7 @@
         <p:spPr>
           <a:xfrm>
             <a:off x="504000" y="301320"/>
-            <a:ext cx="9070200" cy="1260720"/>
+            <a:ext cx="9069840" cy="1260360"/>
           </a:xfrm>
           <a:prstGeom prst="rect">
             <a:avLst/>
@@ -3279,7 +3280,7 @@
         <p:spPr>
           <a:xfrm>
             <a:off x="504000" y="1769040"/>
-            <a:ext cx="9070200" cy="4383000"/>
+            <a:ext cx="9069840" cy="4382640"/>
           </a:xfrm>
           <a:prstGeom prst="rect">
             <a:avLst/>
@@ -3391,7 +3392,7 @@
         <p:spPr>
           <a:xfrm>
             <a:off x="182880" y="0"/>
-            <a:ext cx="9932760" cy="2760480"/>
+            <a:ext cx="9932400" cy="2760120"/>
           </a:xfrm>
           <a:prstGeom prst="rect">
             <a:avLst/>
@@ -3414,7 +3415,7 @@
         <p:spPr>
           <a:xfrm>
             <a:off x="2011680" y="3017520"/>
-            <a:ext cx="5446440" cy="3931920"/>
+            <a:ext cx="5446080" cy="3931560"/>
           </a:xfrm>
           <a:prstGeom prst="rect">
             <a:avLst/>
@@ -3424,6 +3425,40 @@
           </a:ln>
         </p:spPr>
       </p:pic>
+      <p:sp>
+        <p:nvSpPr>
+          <p:cNvPr id="80" name="TextShape 1"/>
+          <p:cNvSpPr txBox="1"/>
+          <p:nvPr/>
+        </p:nvSpPr>
+        <p:spPr>
+          <a:xfrm>
+            <a:off x="4663440" y="274320"/>
+            <a:ext cx="4663440" cy="602280"/>
+          </a:xfrm>
+          <a:prstGeom prst="rect">
+            <a:avLst/>
+          </a:prstGeom>
+          <a:noFill/>
+          <a:ln>
+            <a:noFill/>
+          </a:ln>
+        </p:spPr>
+        <p:txBody>
+          <a:bodyPr lIns="90000" rIns="90000" tIns="45000" bIns="45000"/>
+          <a:p>
+            <a:r>
+              <a:rPr b="0" lang="en-US" sz="1800" spc="-1" strike="noStrike">
+                <a:latin typeface="Arial"/>
+              </a:rPr>
+              <a:t>Source: https://reactjs.org/tutorial/tutorial.html</a:t>
+            </a:r>
+            <a:endParaRPr b="0" lang="en-US" sz="1800" spc="-1" strike="noStrike">
+              <a:latin typeface="Arial"/>
+            </a:endParaRPr>
+          </a:p>
+        </p:txBody>
+      </p:sp>
     </p:spTree>
   </p:cSld>
   <p:timing>
@@ -3475,14 +3510,14 @@
       </p:grpSpPr>
       <p:sp>
         <p:nvSpPr>
-          <p:cNvPr id="80" name="CustomShape 1"/>
+          <p:cNvPr id="81" name="CustomShape 1"/>
           <p:cNvSpPr/>
           <p:nvPr/>
         </p:nvSpPr>
         <p:spPr>
           <a:xfrm>
             <a:off x="548640" y="182880"/>
-            <a:ext cx="8228520" cy="3160800"/>
+            <a:ext cx="8228160" cy="3160440"/>
           </a:xfrm>
           <a:prstGeom prst="rect">
             <a:avLst/>
@@ -3684,7 +3719,7 @@
       </p:sp>
       <p:pic>
         <p:nvPicPr>
-          <p:cNvPr id="81" name="" descr=""/>
+          <p:cNvPr id="82" name="" descr=""/>
           <p:cNvPicPr/>
           <p:nvPr/>
         </p:nvPicPr>
@@ -3695,7 +3730,7 @@
         <p:spPr>
           <a:xfrm>
             <a:off x="1371600" y="3200400"/>
-            <a:ext cx="6485040" cy="1074960"/>
+            <a:ext cx="6484680" cy="1074600"/>
           </a:xfrm>
           <a:prstGeom prst="rect">
             <a:avLst/>
@@ -3707,7 +3742,7 @@
       </p:pic>
       <p:pic>
         <p:nvPicPr>
-          <p:cNvPr id="82" name="" descr=""/>
+          <p:cNvPr id="83" name="" descr=""/>
           <p:cNvPicPr/>
           <p:nvPr/>
         </p:nvPicPr>
@@ -3718,7 +3753,7 @@
         <p:spPr>
           <a:xfrm>
             <a:off x="494640" y="4592160"/>
-            <a:ext cx="8831520" cy="2813760"/>
+            <a:ext cx="8831160" cy="2813400"/>
           </a:xfrm>
           <a:prstGeom prst="rect">
             <a:avLst/>
@@ -3728,6 +3763,40 @@
           </a:ln>
         </p:spPr>
       </p:pic>
+      <p:sp>
+        <p:nvSpPr>
+          <p:cNvPr id="84" name="TextShape 2"/>
+          <p:cNvSpPr txBox="1"/>
+          <p:nvPr/>
+        </p:nvSpPr>
+        <p:spPr>
+          <a:xfrm>
+            <a:off x="274320" y="3969720"/>
+            <a:ext cx="4663440" cy="602280"/>
+          </a:xfrm>
+          <a:prstGeom prst="rect">
+            <a:avLst/>
+          </a:prstGeom>
+          <a:noFill/>
+          <a:ln>
+            <a:noFill/>
+          </a:ln>
+        </p:spPr>
+        <p:txBody>
+          <a:bodyPr lIns="90000" rIns="90000" tIns="45000" bIns="45000"/>
+          <a:p>
+            <a:r>
+              <a:rPr b="0" lang="en-US" sz="1800" spc="-1" strike="noStrike">
+                <a:latin typeface="Arial"/>
+              </a:rPr>
+              <a:t>Source: https://reactjs.org/tutorial/tutorial.html</a:t>
+            </a:r>
+            <a:endParaRPr b="0" lang="en-US" sz="1800" spc="-1" strike="noStrike">
+              <a:latin typeface="Arial"/>
+            </a:endParaRPr>
+          </a:p>
+        </p:txBody>
+      </p:sp>
     </p:spTree>
   </p:cSld>
   <p:timing>
@@ -3779,14 +3848,14 @@
       </p:grpSpPr>
       <p:sp>
         <p:nvSpPr>
-          <p:cNvPr id="83" name="CustomShape 1"/>
+          <p:cNvPr id="85" name="CustomShape 1"/>
           <p:cNvSpPr/>
           <p:nvPr/>
         </p:nvSpPr>
         <p:spPr>
           <a:xfrm>
             <a:off x="822960" y="274320"/>
-            <a:ext cx="8228880" cy="857520"/>
+            <a:ext cx="8228520" cy="857160"/>
           </a:xfrm>
           <a:prstGeom prst="rect">
             <a:avLst/>
@@ -3838,7 +3907,7 @@
       </p:sp>
       <p:pic>
         <p:nvPicPr>
-          <p:cNvPr id="84" name="" descr=""/>
+          <p:cNvPr id="86" name="" descr=""/>
           <p:cNvPicPr/>
           <p:nvPr/>
         </p:nvPicPr>
@@ -3849,7 +3918,7 @@
         <p:spPr>
           <a:xfrm>
             <a:off x="106920" y="1370160"/>
-            <a:ext cx="9859680" cy="4755960"/>
+            <a:ext cx="9859320" cy="4755600"/>
           </a:xfrm>
           <a:prstGeom prst="rect">
             <a:avLst/>
@@ -3859,6 +3928,40 @@
           </a:ln>
         </p:spPr>
       </p:pic>
+      <p:sp>
+        <p:nvSpPr>
+          <p:cNvPr id="87" name="TextShape 2"/>
+          <p:cNvSpPr txBox="1"/>
+          <p:nvPr/>
+        </p:nvSpPr>
+        <p:spPr>
+          <a:xfrm>
+            <a:off x="4297680" y="1005840"/>
+            <a:ext cx="4663440" cy="602280"/>
+          </a:xfrm>
+          <a:prstGeom prst="rect">
+            <a:avLst/>
+          </a:prstGeom>
+          <a:noFill/>
+          <a:ln>
+            <a:noFill/>
+          </a:ln>
+        </p:spPr>
+        <p:txBody>
+          <a:bodyPr lIns="90000" rIns="90000" tIns="45000" bIns="45000"/>
+          <a:p>
+            <a:r>
+              <a:rPr b="0" lang="en-US" sz="1800" spc="-1" strike="noStrike">
+                <a:latin typeface="Arial"/>
+              </a:rPr>
+              <a:t>Source: https://reactjs.org/tutorial/tutorial.html</a:t>
+            </a:r>
+            <a:endParaRPr b="0" lang="en-US" sz="1800" spc="-1" strike="noStrike">
+              <a:latin typeface="Arial"/>
+            </a:endParaRPr>
+          </a:p>
+        </p:txBody>
+      </p:sp>
     </p:spTree>
   </p:cSld>
   <p:timing>
@@ -3910,14 +4013,14 @@
       </p:grpSpPr>
       <p:sp>
         <p:nvSpPr>
-          <p:cNvPr id="85" name="CustomShape 1"/>
+          <p:cNvPr id="88" name="CustomShape 1"/>
           <p:cNvSpPr/>
           <p:nvPr/>
         </p:nvSpPr>
         <p:spPr>
           <a:xfrm>
             <a:off x="365760" y="274320"/>
-            <a:ext cx="9509400" cy="3929400"/>
+            <a:ext cx="9509040" cy="3929040"/>
           </a:xfrm>
           <a:prstGeom prst="rect">
             <a:avLst/>
@@ -3943,7 +4046,11 @@
             </a:pPr>
             <a:r>
               <a:rPr b="0" lang="en-US" sz="1800" spc="-1" strike="noStrike">
-                <a:latin typeface="Arial"/>
+                <a:solidFill>
+                  <a:srgbClr val="000000"/>
+                </a:solidFill>
+                <a:latin typeface="Arial"/>
+                <a:ea typeface="DejaVu Sans"/>
               </a:rPr>
               <a:t>Immutability makes complex features much easier to implement. a “time travel” feature that allows us to review the tic-tac-toe game’s history and “jump back” to previous moves.  an ability to undo and redo certain actions is a common requirement in applications. Avoiding direct data mutation lets us keep previous versions of the game’s history intact, and reuse them later.</a:t>
             </a:r>
@@ -3969,7 +4076,11 @@
             </a:pPr>
             <a:r>
               <a:rPr b="0" lang="en-US" sz="1800" spc="-1" strike="noStrike">
-                <a:latin typeface="Arial"/>
+                <a:solidFill>
+                  <a:srgbClr val="000000"/>
+                </a:solidFill>
+                <a:latin typeface="Arial"/>
+                <a:ea typeface="DejaVu Sans"/>
               </a:rPr>
               <a:t>Detecting Changes</a:t>
             </a:r>
@@ -3985,9 +4096,23 @@
             </a:pPr>
             <a:r>
               <a:rPr b="0" lang="en-US" sz="1800" spc="-1" strike="noStrike">
-                <a:latin typeface="Arial"/>
-              </a:rPr>
-              <a:t>Detecting changes in</a:t>
+                <a:solidFill>
+                  <a:srgbClr val="000000"/>
+                </a:solidFill>
+                <a:latin typeface="Arial"/>
+                <a:ea typeface="DejaVu Sans"/>
+              </a:rPr>
+              <a:t>Detecting changes in </a:t>
+            </a:r>
+            <a:r>
+              <a:rPr b="0" lang="en-US" sz="1800" spc="-1" strike="noStrike">
+                <a:solidFill>
+                  <a:srgbClr val="a3238e"/>
+                </a:solidFill>
+                <a:latin typeface="Arial"/>
+                <a:ea typeface="DejaVu Sans"/>
+              </a:rPr>
+              <a:t>mutable</a:t>
             </a:r>
             <a:r>
               <a:rPr b="0" lang="en-US" sz="1800" spc="-1" strike="noStrike">
@@ -3995,24 +4120,7 @@
                   <a:srgbClr val="000000"/>
                 </a:solidFill>
                 <a:latin typeface="Arial"/>
-              </a:rPr>
-              <a:t> </a:t>
-            </a:r>
-            <a:r>
-              <a:rPr b="0" lang="en-US" sz="1800" spc="-1" strike="noStrike">
-                <a:solidFill>
-                  <a:srgbClr val="a3238e"/>
-                </a:solidFill>
-                <a:latin typeface="Arial"/>
-              </a:rPr>
-              <a:t>mutable</a:t>
-            </a:r>
-            <a:r>
-              <a:rPr b="0" lang="en-US" sz="1800" spc="-1" strike="noStrike">
-                <a:solidFill>
-                  <a:srgbClr val="000000"/>
-                </a:solidFill>
-                <a:latin typeface="Arial"/>
+                <a:ea typeface="DejaVu Sans"/>
               </a:rPr>
               <a:t> objects is difficult because they are modified directly. This detection requires the mutable object to be compared to previous copies of itself and the entire object tree to be traversed.</a:t>
             </a:r>
@@ -4042,6 +4150,7 @@
                   <a:srgbClr val="000000"/>
                 </a:solidFill>
                 <a:latin typeface="Arial"/>
+                <a:ea typeface="DejaVu Sans"/>
               </a:rPr>
               <a:t>Detecting changes in </a:t>
             </a:r>
@@ -4051,6 +4160,7 @@
                   <a:srgbClr val="a3238e"/>
                 </a:solidFill>
                 <a:latin typeface="Arial"/>
+                <a:ea typeface="DejaVu Sans"/>
               </a:rPr>
               <a:t>immutable</a:t>
             </a:r>
@@ -4060,6 +4170,7 @@
                   <a:srgbClr val="000000"/>
                 </a:solidFill>
                 <a:latin typeface="Arial"/>
+                <a:ea typeface="DejaVu Sans"/>
               </a:rPr>
               <a:t> objects is considerably easier. If the immutable object that is being referenced is different than the previous one, then the object has changed.</a:t>
             </a:r>
@@ -4091,14 +4202,14 @@
       </p:sp>
       <p:sp>
         <p:nvSpPr>
-          <p:cNvPr id="86" name="CustomShape 2"/>
+          <p:cNvPr id="89" name="CustomShape 2"/>
           <p:cNvSpPr/>
           <p:nvPr/>
         </p:nvSpPr>
         <p:spPr>
           <a:xfrm>
             <a:off x="457200" y="4023360"/>
-            <a:ext cx="9235080" cy="2137680"/>
+            <a:ext cx="9234720" cy="2137320"/>
           </a:xfrm>
           <a:prstGeom prst="rect">
             <a:avLst/>
@@ -4128,6 +4239,7 @@
                   <a:srgbClr val="a3238e"/>
                 </a:solidFill>
                 <a:latin typeface="Arial"/>
+                <a:ea typeface="DejaVu Sans"/>
               </a:rPr>
               <a:t>Function Components</a:t>
             </a:r>
@@ -4137,13 +4249,45 @@
                   <a:srgbClr val="000000"/>
                 </a:solidFill>
                 <a:latin typeface="Arial"/>
+                <a:ea typeface="DejaVu Sans"/>
               </a:rPr>
               <a:t> - In React, function components are a simpler way to write components that only contain a render method and don’t have their own state. Instead of defining a class which extends React.Component, we can write a function that takes props as input and returns what should be rendered.</a:t>
             </a:r>
             <a:endParaRPr b="0" lang="en-US" sz="1800" spc="-1" strike="noStrike">
-              <a:solidFill>
-                <a:srgbClr val="000000"/>
-              </a:solidFill>
+              <a:latin typeface="Arial"/>
+            </a:endParaRPr>
+          </a:p>
+        </p:txBody>
+      </p:sp>
+      <p:sp>
+        <p:nvSpPr>
+          <p:cNvPr id="90" name="TextShape 3"/>
+          <p:cNvSpPr txBox="1"/>
+          <p:nvPr/>
+        </p:nvSpPr>
+        <p:spPr>
+          <a:xfrm>
+            <a:off x="2743200" y="5760720"/>
+            <a:ext cx="4663440" cy="602280"/>
+          </a:xfrm>
+          <a:prstGeom prst="rect">
+            <a:avLst/>
+          </a:prstGeom>
+          <a:noFill/>
+          <a:ln>
+            <a:noFill/>
+          </a:ln>
+        </p:spPr>
+        <p:txBody>
+          <a:bodyPr lIns="90000" rIns="90000" tIns="45000" bIns="45000"/>
+          <a:p>
+            <a:r>
+              <a:rPr b="0" lang="en-US" sz="1800" spc="-1" strike="noStrike">
+                <a:latin typeface="Arial"/>
+              </a:rPr>
+              <a:t>Source: https://reactjs.org/tutorial/tutorial.html</a:t>
+            </a:r>
+            <a:endParaRPr b="0" lang="en-US" sz="1800" spc="-1" strike="noStrike">
               <a:latin typeface="Arial"/>
             </a:endParaRPr>
           </a:p>
@@ -4158,6 +4302,178 @@
           <p:childTnLst>
             <p:seq>
               <p:cTn id="10" dur="indefinite" nodeType="mainSeq"/>
+              <p:prevCondLst>
+                <p:cond delay="0" evt="onPrev">
+                  <p:tgtEl>
+                    <p:sldTgt/>
+                  </p:tgtEl>
+                </p:cond>
+              </p:prevCondLst>
+              <p:nextCondLst>
+                <p:cond delay="0" evt="onNext">
+                  <p:tgtEl>
+                    <p:sldTgt/>
+                  </p:tgtEl>
+                </p:cond>
+              </p:nextCondLst>
+            </p:seq>
+          </p:childTnLst>
+        </p:cTn>
+      </p:par>
+    </p:tnLst>
+  </p:timing>
+</p:sld>
+</file>
+
+<file path=ppt/slides/slide6.xml><?xml version="1.0" encoding="utf-8"?>
+<p:sld xmlns:a="http://schemas.openxmlformats.org/drawingml/2006/main" xmlns:p="http://schemas.openxmlformats.org/presentationml/2006/main" xmlns:r="http://schemas.openxmlformats.org/officeDocument/2006/relationships" xmlns:p14="http://schemas.microsoft.com/office/powerpoint/2010/main" xmlns:p15="http://schemas.microsoft.com/office/powerpoint/2012/main" xmlns:mc="http://schemas.openxmlformats.org/markup-compatibility/2006">
+  <p:cSld>
+    <p:spTree>
+      <p:nvGrpSpPr>
+        <p:cNvPr id="1" name=""/>
+        <p:cNvGrpSpPr/>
+        <p:nvPr/>
+      </p:nvGrpSpPr>
+      <p:grpSpPr>
+        <a:xfrm>
+          <a:off x="0" y="0"/>
+          <a:ext cx="0" cy="0"/>
+          <a:chOff x="0" y="0"/>
+          <a:chExt cx="0" cy="0"/>
+        </a:xfrm>
+      </p:grpSpPr>
+      <p:sp>
+        <p:nvSpPr>
+          <p:cNvPr id="91" name="TextShape 1"/>
+          <p:cNvSpPr txBox="1"/>
+          <p:nvPr/>
+        </p:nvSpPr>
+        <p:spPr>
+          <a:xfrm>
+            <a:off x="365760" y="824760"/>
+            <a:ext cx="8961120" cy="2649960"/>
+          </a:xfrm>
+          <a:prstGeom prst="rect">
+            <a:avLst/>
+          </a:prstGeom>
+          <a:noFill/>
+          <a:ln>
+            <a:noFill/>
+          </a:ln>
+        </p:spPr>
+        <p:txBody>
+          <a:bodyPr lIns="90000" rIns="90000" tIns="45000" bIns="45000"/>
+          <a:p>
+            <a:r>
+              <a:rPr b="0" lang="en-US" sz="1800" spc="-1" strike="noStrike">
+                <a:solidFill>
+                  <a:srgbClr val="a3238e"/>
+                </a:solidFill>
+                <a:latin typeface="Arial"/>
+              </a:rPr>
+              <a:t>What is ReactJS?</a:t>
+            </a:r>
+            <a:endParaRPr b="0" lang="en-US" sz="1800" spc="-1" strike="noStrike">
+              <a:latin typeface="Arial"/>
+            </a:endParaRPr>
+          </a:p>
+          <a:p>
+            <a:r>
+              <a:rPr b="0" lang="en-US" sz="1800" spc="-1" strike="noStrike">
+                <a:latin typeface="Arial"/>
+              </a:rPr>
+              <a:t>ReactJS is a library that generates the view layer of an application based on its state. ReactJS applications are built from React Components - independent resusable components that describe how the UI should look based on their own state and properties.</a:t>
+            </a:r>
+            <a:endParaRPr b="0" lang="en-US" sz="1800" spc="-1" strike="noStrike">
+              <a:latin typeface="Arial"/>
+            </a:endParaRPr>
+          </a:p>
+          <a:p>
+            <a:endParaRPr b="0" lang="en-US" sz="1800" spc="-1" strike="noStrike">
+              <a:latin typeface="Arial"/>
+            </a:endParaRPr>
+          </a:p>
+          <a:p>
+            <a:r>
+              <a:rPr b="0" lang="en-US" sz="1800" spc="-1" strike="noStrike">
+                <a:solidFill>
+                  <a:srgbClr val="a3238e"/>
+                </a:solidFill>
+                <a:latin typeface="Arial"/>
+              </a:rPr>
+              <a:t>Why should I use ReactJS?</a:t>
+            </a:r>
+            <a:endParaRPr b="0" lang="en-US" sz="1800" spc="-1" strike="noStrike">
+              <a:latin typeface="Arial"/>
+            </a:endParaRPr>
+          </a:p>
+          <a:p>
+            <a:r>
+              <a:rPr b="0" lang="en-US" sz="1800" spc="-1" strike="noStrike">
+                <a:latin typeface="Arial"/>
+              </a:rPr>
+              <a:t>ReactJS applications are incredibly performant at UI rerendering</a:t>
+            </a:r>
+            <a:endParaRPr b="0" lang="en-US" sz="1800" spc="-1" strike="noStrike">
+              <a:latin typeface="Arial"/>
+            </a:endParaRPr>
+          </a:p>
+          <a:p>
+            <a:r>
+              <a:rPr b="0" lang="en-US" sz="1800" spc="-1" strike="noStrike">
+                <a:latin typeface="Arial"/>
+              </a:rPr>
+              <a:t>React Components make writing UI components easier</a:t>
+            </a:r>
+            <a:endParaRPr b="0" lang="en-US" sz="1800" spc="-1" strike="noStrike">
+              <a:latin typeface="Arial"/>
+            </a:endParaRPr>
+          </a:p>
+        </p:txBody>
+      </p:sp>
+      <p:sp>
+        <p:nvSpPr>
+          <p:cNvPr id="92" name="TextShape 2"/>
+          <p:cNvSpPr txBox="1"/>
+          <p:nvPr/>
+        </p:nvSpPr>
+        <p:spPr>
+          <a:xfrm>
+            <a:off x="3566160" y="182880"/>
+            <a:ext cx="3017520" cy="346320"/>
+          </a:xfrm>
+          <a:prstGeom prst="rect">
+            <a:avLst/>
+          </a:prstGeom>
+          <a:noFill/>
+          <a:ln>
+            <a:noFill/>
+          </a:ln>
+        </p:spPr>
+        <p:txBody>
+          <a:bodyPr lIns="90000" rIns="90000" tIns="45000" bIns="45000"/>
+          <a:p>
+            <a:r>
+              <a:rPr b="0" lang="en-US" sz="1800" spc="-1" strike="noStrike">
+                <a:latin typeface="Arial"/>
+              </a:rPr>
+              <a:t>Course Contents Begin</a:t>
+            </a:r>
+            <a:endParaRPr b="0" lang="en-US" sz="1800" spc="-1" strike="noStrike">
+              <a:latin typeface="Arial"/>
+            </a:endParaRPr>
+          </a:p>
+        </p:txBody>
+      </p:sp>
+    </p:spTree>
+  </p:cSld>
+  <p:timing>
+    <p:tnLst>
+      <p:par>
+        <p:cTn id="11" dur="indefinite" restart="never" nodeType="tmRoot">
+          <p:childTnLst>
+            <p:seq>
+              <p:cTn id="12" dur="indefinite" nodeType="mainSeq"/>
               <p:prevCondLst>
                 <p:cond delay="0" evt="onPrev">
                   <p:tgtEl>

</xml_diff>

<commit_message>
React efficient re-rendering and ease to getting started
</commit_message>
<xml_diff>
--- a/LearnReact.pptx
+++ b/LearnReact.pptx
@@ -12,6 +12,7 @@
     <p:sldId id="259" r:id="rId7"/>
     <p:sldId id="260" r:id="rId8"/>
     <p:sldId id="261" r:id="rId9"/>
+    <p:sldId id="262" r:id="rId10"/>
   </p:sldIdLst>
   <p:sldSz cx="10080625" cy="7559675"/>
   <p:notesSz cx="7559675" cy="10691812"/>
@@ -2736,7 +2737,13 @@
               <a:rPr b="0" lang="en-US" sz="4400" spc="-1" strike="noStrike">
                 <a:latin typeface="Arial"/>
               </a:rPr>
-              <a:t>Click to edit the title text format</a:t>
+              <a:t>Click to edit the title </a:t>
+            </a:r>
+            <a:r>
+              <a:rPr b="0" lang="en-US" sz="4400" spc="-1" strike="noStrike">
+                <a:latin typeface="Arial"/>
+              </a:rPr>
+              <a:t>text format</a:t>
             </a:r>
             <a:endParaRPr b="0" lang="en-US" sz="4400" spc="-1" strike="noStrike">
               <a:latin typeface="Arial"/>
@@ -4494,6 +4501,155 @@
       </p:par>
     </p:tnLst>
   </p:timing>
+</p:sld>
+</file>
+
+<file path=ppt/slides/slide7.xml><?xml version="1.0" encoding="utf-8"?>
+<p:sld xmlns:a="http://schemas.openxmlformats.org/drawingml/2006/main" xmlns:p="http://schemas.openxmlformats.org/presentationml/2006/main" xmlns:r="http://schemas.openxmlformats.org/officeDocument/2006/relationships" xmlns:p14="http://schemas.microsoft.com/office/powerpoint/2010/main" xmlns:p15="http://schemas.microsoft.com/office/powerpoint/2012/main" xmlns:mc="http://schemas.openxmlformats.org/markup-compatibility/2006">
+  <p:cSld>
+    <p:spTree>
+      <p:nvGrpSpPr>
+        <p:cNvPr id="1" name=""/>
+        <p:cNvGrpSpPr/>
+        <p:nvPr/>
+      </p:nvGrpSpPr>
+      <p:grpSpPr>
+        <a:xfrm>
+          <a:off x="0" y="0"/>
+          <a:ext cx="0" cy="0"/>
+          <a:chOff x="0" y="0"/>
+          <a:chExt cx="0" cy="0"/>
+        </a:xfrm>
+      </p:grpSpPr>
+      <p:sp>
+        <p:nvSpPr>
+          <p:cNvPr id="93" name="TextShape 1"/>
+          <p:cNvSpPr txBox="1"/>
+          <p:nvPr/>
+        </p:nvSpPr>
+        <p:spPr>
+          <a:xfrm>
+            <a:off x="822960" y="457200"/>
+            <a:ext cx="7772400" cy="4441680"/>
+          </a:xfrm>
+          <a:prstGeom prst="rect">
+            <a:avLst/>
+          </a:prstGeom>
+          <a:noFill/>
+          <a:ln>
+            <a:noFill/>
+          </a:ln>
+        </p:spPr>
+        <p:txBody>
+          <a:bodyPr lIns="90000" rIns="90000" tIns="45000" bIns="45000"/>
+          <a:p>
+            <a:r>
+              <a:rPr b="0" lang="en-US" sz="1800" spc="-1" strike="noStrike">
+                <a:solidFill>
+                  <a:srgbClr val="a3238e"/>
+                </a:solidFill>
+                <a:latin typeface="Arial"/>
+              </a:rPr>
+              <a:t>What makes ReactJS so efficient at rerendering?</a:t>
+            </a:r>
+            <a:endParaRPr b="0" lang="en-US" sz="1800" spc="-1" strike="noStrike">
+              <a:latin typeface="Arial"/>
+            </a:endParaRPr>
+          </a:p>
+          <a:p>
+            <a:r>
+              <a:rPr b="0" lang="en-US" sz="1800" spc="-1" strike="noStrike">
+                <a:latin typeface="Arial"/>
+              </a:rPr>
+              <a:t>React Components are used to generate a Virtual DOM - a light-weight abstraction of the actual HTML DOM. The Virtual DOM is able to be generated much more quickly than the HTML DOM because it does not have to calculate CSS styles and layouts. When a React Component changes state, the Virtual DOM is recreated and the difference between the new Virtual DOM and the previous Virtual DOM is calculated. The ReactJS library then calculates the most efficient way to update the HTML DOM to reflect these changes</a:t>
+            </a:r>
+            <a:endParaRPr b="0" lang="en-US" sz="1800" spc="-1" strike="noStrike">
+              <a:latin typeface="Arial"/>
+            </a:endParaRPr>
+          </a:p>
+          <a:p>
+            <a:endParaRPr b="0" lang="en-US" sz="1800" spc="-1" strike="noStrike">
+              <a:latin typeface="Arial"/>
+            </a:endParaRPr>
+          </a:p>
+          <a:p>
+            <a:r>
+              <a:rPr b="0" lang="en-US" sz="1800" spc="-1" strike="noStrike">
+                <a:solidFill>
+                  <a:srgbClr val="a3238e"/>
+                </a:solidFill>
+                <a:latin typeface="Arial"/>
+              </a:rPr>
+              <a:t>How hard is it to use ReactJS?</a:t>
+            </a:r>
+            <a:endParaRPr b="0" lang="en-US" sz="1800" spc="-1" strike="noStrike">
+              <a:latin typeface="Arial"/>
+            </a:endParaRPr>
+          </a:p>
+          <a:p>
+            <a:r>
+              <a:rPr b="0" lang="en-US" sz="1800" spc="-1" strike="noStrike">
+                <a:latin typeface="Arial"/>
+              </a:rPr>
+              <a:t>ReactJS is a relatively lightweight library and it does not take a whole lot of code to get started with it.</a:t>
+            </a:r>
+            <a:endParaRPr b="0" lang="en-US" sz="1800" spc="-1" strike="noStrike">
+              <a:latin typeface="Arial"/>
+            </a:endParaRPr>
+          </a:p>
+          <a:p>
+            <a:endParaRPr b="0" lang="en-US" sz="1800" spc="-1" strike="noStrike">
+              <a:latin typeface="Arial"/>
+            </a:endParaRPr>
+          </a:p>
+          <a:p>
+            <a:r>
+              <a:rPr b="0" lang="en-US" sz="1800" spc="-1" strike="noStrike">
+                <a:latin typeface="Arial"/>
+              </a:rPr>
+              <a:t>Here is an example of the code needed for a Hello World application:</a:t>
+            </a:r>
+            <a:endParaRPr b="0" lang="en-US" sz="1800" spc="-1" strike="noStrike">
+              <a:latin typeface="Arial"/>
+            </a:endParaRPr>
+          </a:p>
+          <a:p>
+            <a:endParaRPr b="0" lang="en-US" sz="1800" spc="-1" strike="noStrike">
+              <a:latin typeface="Arial"/>
+            </a:endParaRPr>
+          </a:p>
+          <a:p>
+            <a:endParaRPr b="0" lang="en-US" sz="1800" spc="-1" strike="noStrike">
+              <a:latin typeface="Arial"/>
+            </a:endParaRPr>
+          </a:p>
+        </p:txBody>
+      </p:sp>
+      <p:pic>
+        <p:nvPicPr>
+          <p:cNvPr id="94" name="" descr=""/>
+          <p:cNvPicPr/>
+          <p:nvPr/>
+        </p:nvPicPr>
+        <p:blipFill>
+          <a:blip r:embed="rId1"/>
+          <a:stretch/>
+        </p:blipFill>
+        <p:spPr>
+          <a:xfrm>
+            <a:off x="2476800" y="4924800"/>
+            <a:ext cx="4381200" cy="1933200"/>
+          </a:xfrm>
+          <a:prstGeom prst="rect">
+            <a:avLst/>
+          </a:prstGeom>
+          <a:ln>
+            <a:noFill/>
+          </a:ln>
+        </p:spPr>
+      </p:pic>
+    </p:spTree>
+  </p:cSld>
 </p:sld>
 </file>
 

</xml_diff>

<commit_message>
React code getting started
</commit_message>
<xml_diff>
--- a/LearnReact.pptx
+++ b/LearnReact.pptx
@@ -13,6 +13,13 @@
     <p:sldId id="260" r:id="rId8"/>
     <p:sldId id="261" r:id="rId9"/>
     <p:sldId id="262" r:id="rId10"/>
+    <p:sldId id="263" r:id="rId11"/>
+    <p:sldId id="264" r:id="rId12"/>
+    <p:sldId id="265" r:id="rId13"/>
+    <p:sldId id="266" r:id="rId14"/>
+    <p:sldId id="267" r:id="rId15"/>
+    <p:sldId id="268" r:id="rId16"/>
+    <p:sldId id="269" r:id="rId17"/>
   </p:sldIdLst>
   <p:sldSz cx="10080625" cy="7559675"/>
   <p:notesSz cx="7559675" cy="10691812"/>
@@ -2737,13 +2744,7 @@
               <a:rPr b="0" lang="en-US" sz="4400" spc="-1" strike="noStrike">
                 <a:latin typeface="Arial"/>
               </a:rPr>
-              <a:t>Click to edit the title </a:t>
-            </a:r>
-            <a:r>
-              <a:rPr b="0" lang="en-US" sz="4400" spc="-1" strike="noStrike">
-                <a:latin typeface="Arial"/>
-              </a:rPr>
-              <a:t>text format</a:t>
+              <a:t>Click to edit the title text format</a:t>
             </a:r>
             <a:endParaRPr b="0" lang="en-US" sz="4400" spc="-1" strike="noStrike">
               <a:latin typeface="Arial"/>
@@ -3366,6 +3367,116 @@
       </p:par>
     </p:tnLst>
   </p:timing>
+</p:sld>
+</file>
+
+<file path=ppt/slides/slide10.xml><?xml version="1.0" encoding="utf-8"?>
+<p:sld xmlns:a="http://schemas.openxmlformats.org/drawingml/2006/main" xmlns:p="http://schemas.openxmlformats.org/presentationml/2006/main" xmlns:r="http://schemas.openxmlformats.org/officeDocument/2006/relationships" xmlns:p14="http://schemas.microsoft.com/office/powerpoint/2010/main" xmlns:p15="http://schemas.microsoft.com/office/powerpoint/2012/main" xmlns:mc="http://schemas.openxmlformats.org/markup-compatibility/2006">
+  <p:cSld>
+    <p:spTree>
+      <p:nvGrpSpPr>
+        <p:cNvPr id="1" name=""/>
+        <p:cNvGrpSpPr/>
+        <p:nvPr/>
+      </p:nvGrpSpPr>
+      <p:grpSpPr>
+        <a:xfrm>
+          <a:off x="0" y="0"/>
+          <a:ext cx="0" cy="0"/>
+          <a:chOff x="0" y="0"/>
+          <a:chExt cx="0" cy="0"/>
+        </a:xfrm>
+      </p:grpSpPr>
+    </p:spTree>
+  </p:cSld>
+</p:sld>
+</file>
+
+<file path=ppt/slides/slide11.xml><?xml version="1.0" encoding="utf-8"?>
+<p:sld xmlns:a="http://schemas.openxmlformats.org/drawingml/2006/main" xmlns:p="http://schemas.openxmlformats.org/presentationml/2006/main" xmlns:r="http://schemas.openxmlformats.org/officeDocument/2006/relationships" xmlns:p14="http://schemas.microsoft.com/office/powerpoint/2010/main" xmlns:p15="http://schemas.microsoft.com/office/powerpoint/2012/main" xmlns:mc="http://schemas.openxmlformats.org/markup-compatibility/2006">
+  <p:cSld>
+    <p:spTree>
+      <p:nvGrpSpPr>
+        <p:cNvPr id="1" name=""/>
+        <p:cNvGrpSpPr/>
+        <p:nvPr/>
+      </p:nvGrpSpPr>
+      <p:grpSpPr>
+        <a:xfrm>
+          <a:off x="0" y="0"/>
+          <a:ext cx="0" cy="0"/>
+          <a:chOff x="0" y="0"/>
+          <a:chExt cx="0" cy="0"/>
+        </a:xfrm>
+      </p:grpSpPr>
+    </p:spTree>
+  </p:cSld>
+</p:sld>
+</file>
+
+<file path=ppt/slides/slide12.xml><?xml version="1.0" encoding="utf-8"?>
+<p:sld xmlns:a="http://schemas.openxmlformats.org/drawingml/2006/main" xmlns:p="http://schemas.openxmlformats.org/presentationml/2006/main" xmlns:r="http://schemas.openxmlformats.org/officeDocument/2006/relationships" xmlns:p14="http://schemas.microsoft.com/office/powerpoint/2010/main" xmlns:p15="http://schemas.microsoft.com/office/powerpoint/2012/main" xmlns:mc="http://schemas.openxmlformats.org/markup-compatibility/2006">
+  <p:cSld>
+    <p:spTree>
+      <p:nvGrpSpPr>
+        <p:cNvPr id="1" name=""/>
+        <p:cNvGrpSpPr/>
+        <p:nvPr/>
+      </p:nvGrpSpPr>
+      <p:grpSpPr>
+        <a:xfrm>
+          <a:off x="0" y="0"/>
+          <a:ext cx="0" cy="0"/>
+          <a:chOff x="0" y="0"/>
+          <a:chExt cx="0" cy="0"/>
+        </a:xfrm>
+      </p:grpSpPr>
+    </p:spTree>
+  </p:cSld>
+</p:sld>
+</file>
+
+<file path=ppt/slides/slide13.xml><?xml version="1.0" encoding="utf-8"?>
+<p:sld xmlns:a="http://schemas.openxmlformats.org/drawingml/2006/main" xmlns:p="http://schemas.openxmlformats.org/presentationml/2006/main" xmlns:r="http://schemas.openxmlformats.org/officeDocument/2006/relationships" xmlns:p14="http://schemas.microsoft.com/office/powerpoint/2010/main" xmlns:p15="http://schemas.microsoft.com/office/powerpoint/2012/main" xmlns:mc="http://schemas.openxmlformats.org/markup-compatibility/2006">
+  <p:cSld>
+    <p:spTree>
+      <p:nvGrpSpPr>
+        <p:cNvPr id="1" name=""/>
+        <p:cNvGrpSpPr/>
+        <p:nvPr/>
+      </p:nvGrpSpPr>
+      <p:grpSpPr>
+        <a:xfrm>
+          <a:off x="0" y="0"/>
+          <a:ext cx="0" cy="0"/>
+          <a:chOff x="0" y="0"/>
+          <a:chExt cx="0" cy="0"/>
+        </a:xfrm>
+      </p:grpSpPr>
+    </p:spTree>
+  </p:cSld>
+</p:sld>
+</file>
+
+<file path=ppt/slides/slide14.xml><?xml version="1.0" encoding="utf-8"?>
+<p:sld xmlns:a="http://schemas.openxmlformats.org/drawingml/2006/main" xmlns:p="http://schemas.openxmlformats.org/presentationml/2006/main" xmlns:r="http://schemas.openxmlformats.org/officeDocument/2006/relationships" xmlns:p14="http://schemas.microsoft.com/office/powerpoint/2010/main" xmlns:p15="http://schemas.microsoft.com/office/powerpoint/2012/main" xmlns:mc="http://schemas.openxmlformats.org/markup-compatibility/2006">
+  <p:cSld>
+    <p:spTree>
+      <p:nvGrpSpPr>
+        <p:cNvPr id="1" name=""/>
+        <p:cNvGrpSpPr/>
+        <p:nvPr/>
+      </p:nvGrpSpPr>
+      <p:grpSpPr>
+        <a:xfrm>
+          <a:off x="0" y="0"/>
+          <a:ext cx="0" cy="0"/>
+          <a:chOff x="0" y="0"/>
+          <a:chExt cx="0" cy="0"/>
+        </a:xfrm>
+      </p:grpSpPr>
+    </p:spTree>
+  </p:cSld>
 </p:sld>
 </file>
 
@@ -4648,6 +4759,168 @@
           </a:ln>
         </p:spPr>
       </p:pic>
+    </p:spTree>
+  </p:cSld>
+  <p:timing>
+    <p:tnLst>
+      <p:par>
+        <p:cTn id="13" dur="indefinite" restart="never" nodeType="tmRoot">
+          <p:childTnLst>
+            <p:seq>
+              <p:cTn id="14" dur="indefinite" nodeType="mainSeq"/>
+              <p:prevCondLst>
+                <p:cond delay="0" evt="onPrev">
+                  <p:tgtEl>
+                    <p:sldTgt/>
+                  </p:tgtEl>
+                </p:cond>
+              </p:prevCondLst>
+              <p:nextCondLst>
+                <p:cond delay="0" evt="onNext">
+                  <p:tgtEl>
+                    <p:sldTgt/>
+                  </p:tgtEl>
+                </p:cond>
+              </p:nextCondLst>
+            </p:seq>
+          </p:childTnLst>
+        </p:cTn>
+      </p:par>
+    </p:tnLst>
+  </p:timing>
+</p:sld>
+</file>
+
+<file path=ppt/slides/slide8.xml><?xml version="1.0" encoding="utf-8"?>
+<p:sld xmlns:a="http://schemas.openxmlformats.org/drawingml/2006/main" xmlns:p="http://schemas.openxmlformats.org/presentationml/2006/main" xmlns:r="http://schemas.openxmlformats.org/officeDocument/2006/relationships" xmlns:p14="http://schemas.microsoft.com/office/powerpoint/2010/main" xmlns:p15="http://schemas.microsoft.com/office/powerpoint/2012/main" xmlns:mc="http://schemas.openxmlformats.org/markup-compatibility/2006">
+  <p:cSld>
+    <p:spTree>
+      <p:nvGrpSpPr>
+        <p:cNvPr id="1" name=""/>
+        <p:cNvGrpSpPr/>
+        <p:nvPr/>
+      </p:nvGrpSpPr>
+      <p:grpSpPr>
+        <a:xfrm>
+          <a:off x="0" y="0"/>
+          <a:ext cx="0" cy="0"/>
+          <a:chOff x="0" y="0"/>
+          <a:chExt cx="0" cy="0"/>
+        </a:xfrm>
+      </p:grpSpPr>
+      <p:sp>
+        <p:nvSpPr>
+          <p:cNvPr id="95" name="TextShape 1"/>
+          <p:cNvSpPr txBox="1"/>
+          <p:nvPr/>
+        </p:nvSpPr>
+        <p:spPr>
+          <a:xfrm>
+            <a:off x="457200" y="220680"/>
+            <a:ext cx="9052560" cy="602280"/>
+          </a:xfrm>
+          <a:prstGeom prst="rect">
+            <a:avLst/>
+          </a:prstGeom>
+          <a:noFill/>
+          <a:ln>
+            <a:noFill/>
+          </a:ln>
+        </p:spPr>
+        <p:txBody>
+          <a:bodyPr lIns="90000" rIns="90000" tIns="45000" bIns="45000"/>
+          <a:p>
+            <a:r>
+              <a:rPr b="0" lang="en-US" sz="1800" spc="-1" strike="noStrike">
+                <a:solidFill>
+                  <a:srgbClr val="a3238e"/>
+                </a:solidFill>
+                <a:latin typeface="Arial"/>
+              </a:rPr>
+              <a:t>React Elements</a:t>
+            </a:r>
+            <a:r>
+              <a:rPr b="0" lang="en-US" sz="1800" spc="-1" strike="noStrike">
+                <a:latin typeface="Arial"/>
+              </a:rPr>
+              <a:t> are objects that represent a DOM node. They are written </a:t>
+            </a:r>
+            <a:r>
+              <a:rPr b="0" lang="en-US" sz="1800" spc="-1" strike="noStrike">
+                <a:latin typeface="Arial"/>
+              </a:rPr>
+              <a:t>using a syntax extension named </a:t>
+            </a:r>
+            <a:r>
+              <a:rPr b="0" lang="en-US" sz="1800" spc="-1" strike="noStrike">
+                <a:solidFill>
+                  <a:srgbClr val="a3238e"/>
+                </a:solidFill>
+                <a:latin typeface="Arial"/>
+              </a:rPr>
+              <a:t>JSX</a:t>
+            </a:r>
+            <a:r>
+              <a:rPr b="0" lang="en-US" sz="1800" spc="-1" strike="noStrike">
+                <a:latin typeface="Arial"/>
+              </a:rPr>
+              <a:t> </a:t>
+            </a:r>
+            <a:endParaRPr b="0" lang="en-US" sz="1800" spc="-1" strike="noStrike">
+              <a:latin typeface="Arial"/>
+            </a:endParaRPr>
+          </a:p>
+        </p:txBody>
+      </p:sp>
+    </p:spTree>
+  </p:cSld>
+  <p:timing>
+    <p:tnLst>
+      <p:par>
+        <p:cTn id="15" dur="indefinite" restart="never" nodeType="tmRoot">
+          <p:childTnLst>
+            <p:seq>
+              <p:cTn id="16" dur="indefinite" nodeType="mainSeq"/>
+              <p:prevCondLst>
+                <p:cond delay="0" evt="onPrev">
+                  <p:tgtEl>
+                    <p:sldTgt/>
+                  </p:tgtEl>
+                </p:cond>
+              </p:prevCondLst>
+              <p:nextCondLst>
+                <p:cond delay="0" evt="onNext">
+                  <p:tgtEl>
+                    <p:sldTgt/>
+                  </p:tgtEl>
+                </p:cond>
+              </p:nextCondLst>
+            </p:seq>
+          </p:childTnLst>
+        </p:cTn>
+      </p:par>
+    </p:tnLst>
+  </p:timing>
+</p:sld>
+</file>
+
+<file path=ppt/slides/slide9.xml><?xml version="1.0" encoding="utf-8"?>
+<p:sld xmlns:a="http://schemas.openxmlformats.org/drawingml/2006/main" xmlns:p="http://schemas.openxmlformats.org/presentationml/2006/main" xmlns:r="http://schemas.openxmlformats.org/officeDocument/2006/relationships" xmlns:p14="http://schemas.microsoft.com/office/powerpoint/2010/main" xmlns:p15="http://schemas.microsoft.com/office/powerpoint/2012/main" xmlns:mc="http://schemas.openxmlformats.org/markup-compatibility/2006">
+  <p:cSld>
+    <p:spTree>
+      <p:nvGrpSpPr>
+        <p:cNvPr id="1" name=""/>
+        <p:cNvGrpSpPr/>
+        <p:nvPr/>
+      </p:nvGrpSpPr>
+      <p:grpSpPr>
+        <a:xfrm>
+          <a:off x="0" y="0"/>
+          <a:ext cx="0" cy="0"/>
+          <a:chOff x="0" y="0"/>
+          <a:chExt cx="0" cy="0"/>
+        </a:xfrm>
+      </p:grpSpPr>
     </p:spTree>
   </p:cSld>
 </p:sld>

</xml_diff>